<commit_message>
requirements.txt foi adicionado ao projeto
</commit_message>
<xml_diff>
--- a/Django and Celery.pptx
+++ b/Django and Celery.pptx
@@ -114,6 +114,11 @@
       </a:defRPr>
     </a:lvl9pPr>
   </p:defaultTextStyle>
+  <p:extLst>
+    <p:ext uri="{EFAFB233-063F-42B5-8137-9DF3F51BA10A}">
+      <p15:sldGuideLst xmlns:p15="http://schemas.microsoft.com/office/powerpoint/2012/main"/>
+    </p:ext>
+  </p:extLst>
 </p:presentation>
 </file>
 
@@ -264,7 +269,7 @@
           <a:p>
             <a:fld id="{73783359-6992-4ED6-9E5B-6051EF794C2F}" type="datetimeFigureOut">
               <a:rPr lang="pt-BR" smtClean="0"/>
-              <a:t>25/02/2020</a:t>
+              <a:t>26/02/2020</a:t>
             </a:fld>
             <a:endParaRPr lang="pt-BR"/>
           </a:p>
@@ -462,7 +467,7 @@
           <a:p>
             <a:fld id="{73783359-6992-4ED6-9E5B-6051EF794C2F}" type="datetimeFigureOut">
               <a:rPr lang="pt-BR" smtClean="0"/>
-              <a:t>25/02/2020</a:t>
+              <a:t>26/02/2020</a:t>
             </a:fld>
             <a:endParaRPr lang="pt-BR"/>
           </a:p>
@@ -670,7 +675,7 @@
           <a:p>
             <a:fld id="{73783359-6992-4ED6-9E5B-6051EF794C2F}" type="datetimeFigureOut">
               <a:rPr lang="pt-BR" smtClean="0"/>
-              <a:t>25/02/2020</a:t>
+              <a:t>26/02/2020</a:t>
             </a:fld>
             <a:endParaRPr lang="pt-BR"/>
           </a:p>
@@ -868,7 +873,7 @@
           <a:p>
             <a:fld id="{73783359-6992-4ED6-9E5B-6051EF794C2F}" type="datetimeFigureOut">
               <a:rPr lang="pt-BR" smtClean="0"/>
-              <a:t>25/02/2020</a:t>
+              <a:t>26/02/2020</a:t>
             </a:fld>
             <a:endParaRPr lang="pt-BR"/>
           </a:p>
@@ -1143,7 +1148,7 @@
           <a:p>
             <a:fld id="{73783359-6992-4ED6-9E5B-6051EF794C2F}" type="datetimeFigureOut">
               <a:rPr lang="pt-BR" smtClean="0"/>
-              <a:t>25/02/2020</a:t>
+              <a:t>26/02/2020</a:t>
             </a:fld>
             <a:endParaRPr lang="pt-BR"/>
           </a:p>
@@ -1408,7 +1413,7 @@
           <a:p>
             <a:fld id="{73783359-6992-4ED6-9E5B-6051EF794C2F}" type="datetimeFigureOut">
               <a:rPr lang="pt-BR" smtClean="0"/>
-              <a:t>25/02/2020</a:t>
+              <a:t>26/02/2020</a:t>
             </a:fld>
             <a:endParaRPr lang="pt-BR"/>
           </a:p>
@@ -1820,7 +1825,7 @@
           <a:p>
             <a:fld id="{73783359-6992-4ED6-9E5B-6051EF794C2F}" type="datetimeFigureOut">
               <a:rPr lang="pt-BR" smtClean="0"/>
-              <a:t>25/02/2020</a:t>
+              <a:t>26/02/2020</a:t>
             </a:fld>
             <a:endParaRPr lang="pt-BR"/>
           </a:p>
@@ -1961,7 +1966,7 @@
           <a:p>
             <a:fld id="{73783359-6992-4ED6-9E5B-6051EF794C2F}" type="datetimeFigureOut">
               <a:rPr lang="pt-BR" smtClean="0"/>
-              <a:t>25/02/2020</a:t>
+              <a:t>26/02/2020</a:t>
             </a:fld>
             <a:endParaRPr lang="pt-BR"/>
           </a:p>
@@ -2074,7 +2079,7 @@
           <a:p>
             <a:fld id="{73783359-6992-4ED6-9E5B-6051EF794C2F}" type="datetimeFigureOut">
               <a:rPr lang="pt-BR" smtClean="0"/>
-              <a:t>25/02/2020</a:t>
+              <a:t>26/02/2020</a:t>
             </a:fld>
             <a:endParaRPr lang="pt-BR"/>
           </a:p>
@@ -2385,7 +2390,7 @@
           <a:p>
             <a:fld id="{73783359-6992-4ED6-9E5B-6051EF794C2F}" type="datetimeFigureOut">
               <a:rPr lang="pt-BR" smtClean="0"/>
-              <a:t>25/02/2020</a:t>
+              <a:t>26/02/2020</a:t>
             </a:fld>
             <a:endParaRPr lang="pt-BR"/>
           </a:p>
@@ -2673,7 +2678,7 @@
           <a:p>
             <a:fld id="{73783359-6992-4ED6-9E5B-6051EF794C2F}" type="datetimeFigureOut">
               <a:rPr lang="pt-BR" smtClean="0"/>
-              <a:t>25/02/2020</a:t>
+              <a:t>26/02/2020</a:t>
             </a:fld>
             <a:endParaRPr lang="pt-BR"/>
           </a:p>
@@ -2914,7 +2919,7 @@
           <a:p>
             <a:fld id="{73783359-6992-4ED6-9E5B-6051EF794C2F}" type="datetimeFigureOut">
               <a:rPr lang="pt-BR" smtClean="0"/>
-              <a:t>25/02/2020</a:t>
+              <a:t>26/02/2020</a:t>
             </a:fld>
             <a:endParaRPr lang="pt-BR"/>
           </a:p>
@@ -3833,6 +3838,31 @@
               <a:t>3. CELERY BEAT</a:t>
             </a:r>
           </a:p>
+          <a:p>
+            <a:pPr marL="0" indent="0">
+              <a:buNone/>
+            </a:pPr>
+            <a:endParaRPr lang="pt-BR" dirty="0"/>
+          </a:p>
+          <a:p>
+            <a:pPr marL="0" indent="0">
+              <a:buNone/>
+            </a:pPr>
+            <a:r>
+              <a:rPr lang="en-US" dirty="0"/>
+              <a:t>*Import commands: 	pip freeze &gt; requirements.txt</a:t>
+            </a:r>
+          </a:p>
+          <a:p>
+            <a:pPr marL="0" indent="0">
+              <a:buNone/>
+            </a:pPr>
+            <a:r>
+              <a:rPr lang="en-US" dirty="0"/>
+              <a:t>			            pip install -r requirements.txt</a:t>
+            </a:r>
+            <a:endParaRPr lang="pt-BR" dirty="0"/>
+          </a:p>
         </p:txBody>
       </p:sp>
     </p:spTree>

</xml_diff>